<commit_message>
VERSIÓN FINAL: MEM + CÓDIGO
</commit_message>
<xml_diff>
--- a/Defensa/transparenciasDefensa.pptx
+++ b/Defensa/transparenciasDefensa.pptx
@@ -8083,6 +8083,40 @@
           </a:bodyPr>
           <a:lstStyle/>
           <a:p>
+            <a:pPr marL="0" marR="0" lvl="0" indent="0" algn="l" defTabSz="914400" rtl="0" eaLnBrk="1" fontAlgn="auto" latinLnBrk="0" hangingPunct="1">
+              <a:lnSpc>
+                <a:spcPct val="100000"/>
+              </a:lnSpc>
+              <a:spcBef>
+                <a:spcPts val="0"/>
+              </a:spcBef>
+              <a:spcAft>
+                <a:spcPts val="0"/>
+              </a:spcAft>
+              <a:buClr>
+                <a:srgbClr val="000000"/>
+              </a:buClr>
+              <a:buSzPts val="1400"/>
+              <a:buFont typeface="Arial"/>
+              <a:buNone/>
+              <a:tabLst/>
+              <a:defRPr/>
+            </a:pPr>
+            <a:r>
+              <a:rPr lang="es-ES" sz="1100" b="0" i="0" u="none" strike="noStrike" cap="none" dirty="0">
+                <a:solidFill>
+                  <a:srgbClr val="000000"/>
+                </a:solidFill>
+                <a:effectLst/>
+                <a:latin typeface="Arial"/>
+                <a:ea typeface="Arial"/>
+                <a:cs typeface="Arial"/>
+                <a:sym typeface="Arial"/>
+              </a:rPr>
+              <a:t>A continuación, veremos algunas de las simulaciones realizadas con el modelo macroscópico</a:t>
+            </a:r>
+          </a:p>
+          <a:p>
             <a:pPr marL="0" lvl="0" indent="0" algn="l" rtl="0">
               <a:spcBef>
                 <a:spcPts val="0"/>
@@ -8092,7 +8126,7 @@
               </a:spcAft>
               <a:buNone/>
             </a:pPr>
-            <a:endParaRPr/>
+            <a:endParaRPr dirty="0"/>
           </a:p>
         </p:txBody>
       </p:sp>
@@ -8110,11 +8144,11 @@
 </file>
 
 <file path=ppt/notesSlides/notesSlide19.xml><?xml version="1.0" encoding="utf-8"?>
-<p:notes xmlns:a="http://schemas.openxmlformats.org/drawingml/2006/main" xmlns:r="http://schemas.openxmlformats.org/officeDocument/2006/relationships" xmlns:p="http://schemas.openxmlformats.org/presentationml/2006/main" showMasterSp="0" showMasterPhAnim="0">
+<p:notes xmlns:a="http://schemas.openxmlformats.org/drawingml/2006/main" xmlns:r="http://schemas.openxmlformats.org/officeDocument/2006/relationships" xmlns:p="http://schemas.openxmlformats.org/presentationml/2006/main">
   <p:cSld>
     <p:spTree>
       <p:nvGrpSpPr>
-        <p:cNvPr id="1" name="Shape 70"/>
+        <p:cNvPr id="1" name=""/>
         <p:cNvGrpSpPr/>
         <p:nvPr/>
       </p:nvGrpSpPr>
@@ -8128,12 +8162,12 @@
       </p:grpSpPr>
       <p:sp>
         <p:nvSpPr>
-          <p:cNvPr id="71" name="Google Shape;71;g35f391192_029:notes"/>
+          <p:cNvPr id="2" name="Marcador de imagen de diapositiva 1"/>
           <p:cNvSpPr>
             <a:spLocks noGrp="1" noRot="1" noChangeAspect="1"/>
           </p:cNvSpPr>
           <p:nvPr>
-            <p:ph type="sldImg" idx="2"/>
+            <p:ph type="sldImg"/>
           </p:nvPr>
         </p:nvSpPr>
         <p:spPr>
@@ -8141,74 +8175,105 @@
             <a:off x="381000" y="685800"/>
             <a:ext cx="6096000" cy="3429000"/>
           </a:xfrm>
-          <a:custGeom>
-            <a:avLst/>
-            <a:gdLst/>
-            <a:ahLst/>
-            <a:cxnLst/>
-            <a:rect l="l" t="t" r="r" b="b"/>
-            <a:pathLst>
-              <a:path w="120000" h="120000" extrusionOk="0">
-                <a:moveTo>
-                  <a:pt x="0" y="0"/>
-                </a:moveTo>
-                <a:lnTo>
-                  <a:pt x="120000" y="0"/>
-                </a:lnTo>
-                <a:lnTo>
-                  <a:pt x="120000" y="120000"/>
-                </a:lnTo>
-                <a:lnTo>
-                  <a:pt x="0" y="120000"/>
-                </a:lnTo>
-                <a:close/>
-              </a:path>
-            </a:pathLst>
-          </a:custGeom>
         </p:spPr>
       </p:sp>
       <p:sp>
         <p:nvSpPr>
-          <p:cNvPr id="72" name="Google Shape;72;g35f391192_029:notes"/>
-          <p:cNvSpPr txBox="1">
+          <p:cNvPr id="3" name="Marcador de notas 2"/>
+          <p:cNvSpPr>
             <a:spLocks noGrp="1"/>
           </p:cNvSpPr>
           <p:nvPr>
             <p:ph type="body" idx="1"/>
           </p:nvPr>
         </p:nvSpPr>
-        <p:spPr>
-          <a:xfrm>
-            <a:off x="685800" y="4343400"/>
-            <a:ext cx="5486400" cy="4114800"/>
-          </a:xfrm>
-          <a:prstGeom prst="rect">
-            <a:avLst/>
-          </a:prstGeom>
-        </p:spPr>
+        <p:spPr/>
         <p:txBody>
-          <a:bodyPr spcFirstLastPara="1" wrap="square" lIns="91425" tIns="91425" rIns="91425" bIns="91425" anchor="t" anchorCtr="0">
-            <a:noAutofit/>
-          </a:bodyPr>
+          <a:bodyPr/>
           <a:lstStyle/>
           <a:p>
-            <a:pPr marL="0" lvl="0" indent="0" algn="l" rtl="0">
-              <a:spcBef>
-                <a:spcPts val="0"/>
-              </a:spcBef>
-              <a:spcAft>
-                <a:spcPts val="0"/>
-              </a:spcAft>
+            <a:r>
+              <a:rPr lang="es-ES" sz="1100" b="0" i="0" u="none" strike="noStrike" cap="none" dirty="0">
+                <a:solidFill>
+                  <a:srgbClr val="000000"/>
+                </a:solidFill>
+                <a:effectLst/>
+                <a:latin typeface="Arial"/>
+                <a:ea typeface="Arial"/>
+                <a:cs typeface="Arial"/>
+                <a:sym typeface="Arial"/>
+              </a:rPr>
+              <a:t>Como vemos, el comportamiento de tolerancia e intolerancia al patógeno en este caso es análogo al visto para el modelo microscópico. En ambos casos se pone de manifiesto las características de elasticidad e inercia de la población de células T. </a:t>
+            </a:r>
+          </a:p>
+          <a:p>
+            <a:pPr marL="139700" indent="0">
               <a:buNone/>
             </a:pPr>
-            <a:endParaRPr/>
+            <a:r>
+              <a:rPr lang="es-ES" sz="1100" b="0" i="0" u="none" strike="noStrike" cap="none" dirty="0">
+                <a:solidFill>
+                  <a:srgbClr val="000000"/>
+                </a:solidFill>
+                <a:effectLst/>
+                <a:latin typeface="Arial"/>
+                <a:ea typeface="Arial"/>
+                <a:cs typeface="Arial"/>
+                <a:sym typeface="Arial"/>
+              </a:rPr>
+              <a:t> </a:t>
+            </a:r>
+          </a:p>
+          <a:p>
+            <a:r>
+              <a:rPr lang="es-ES" sz="1100" b="0" i="0" u="none" strike="noStrike" cap="none" dirty="0">
+                <a:solidFill>
+                  <a:srgbClr val="000000"/>
+                </a:solidFill>
+                <a:effectLst/>
+                <a:latin typeface="Arial"/>
+                <a:ea typeface="Arial"/>
+                <a:cs typeface="Arial"/>
+                <a:sym typeface="Arial"/>
+              </a:rPr>
+              <a:t>En la figura de la derecha se puede observar un comportamiento de tolerancia en el que ha tenido lugar una recaída de la infección. Tras la primera expansión clonal de las células T, le sigue la contracción clonal, sin embargo, en este caso, la tasa de reproducción del patógeno, </a:t>
+            </a:r>
+            <a:r>
+              <a:rPr lang="es-ES" sz="1100" b="0" i="0" u="none" strike="noStrike" cap="none" dirty="0" err="1">
+                <a:solidFill>
+                  <a:srgbClr val="000000"/>
+                </a:solidFill>
+                <a:effectLst/>
+                <a:latin typeface="Arial"/>
+                <a:ea typeface="Arial"/>
+                <a:cs typeface="Arial"/>
+                <a:sym typeface="Arial"/>
+              </a:rPr>
+              <a:t>alpha</a:t>
+            </a:r>
+            <a:r>
+              <a:rPr lang="es-ES" sz="1100" b="0" i="0" u="none" strike="noStrike" cap="none" dirty="0">
+                <a:solidFill>
+                  <a:srgbClr val="000000"/>
+                </a:solidFill>
+                <a:effectLst/>
+                <a:latin typeface="Arial"/>
+                <a:ea typeface="Arial"/>
+                <a:cs typeface="Arial"/>
+                <a:sym typeface="Arial"/>
+              </a:rPr>
+              <a:t>, y el número de células del patógeno aún existentes son suficientes para contrarrestar la fuerza elástica de las células T, k, provocando así que vuelva a aumentar la población de estas últimas, repitiendo el proceso.</a:t>
+            </a:r>
+          </a:p>
+          <a:p>
+            <a:endParaRPr lang="es-ES" dirty="0"/>
           </a:p>
         </p:txBody>
       </p:sp>
     </p:spTree>
     <p:extLst>
       <p:ext uri="{BB962C8B-B14F-4D97-AF65-F5344CB8AC3E}">
-        <p14:creationId xmlns:p14="http://schemas.microsoft.com/office/powerpoint/2010/main" val="2226417868"/>
+        <p14:creationId xmlns:p14="http://schemas.microsoft.com/office/powerpoint/2010/main" val="3923464836"/>
       </p:ext>
     </p:extLst>
   </p:cSld>
@@ -8362,6 +8427,267 @@
 </file>
 
 <file path=ppt/notesSlides/notesSlide20.xml><?xml version="1.0" encoding="utf-8"?>
+<p:notes xmlns:a="http://schemas.openxmlformats.org/drawingml/2006/main" xmlns:r="http://schemas.openxmlformats.org/officeDocument/2006/relationships" xmlns:p="http://schemas.openxmlformats.org/presentationml/2006/main">
+  <p:cSld>
+    <p:spTree>
+      <p:nvGrpSpPr>
+        <p:cNvPr id="1" name=""/>
+        <p:cNvGrpSpPr/>
+        <p:nvPr/>
+      </p:nvGrpSpPr>
+      <p:grpSpPr>
+        <a:xfrm>
+          <a:off x="0" y="0"/>
+          <a:ext cx="0" cy="0"/>
+          <a:chOff x="0" y="0"/>
+          <a:chExt cx="0" cy="0"/>
+        </a:xfrm>
+      </p:grpSpPr>
+      <p:sp>
+        <p:nvSpPr>
+          <p:cNvPr id="2" name="Marcador de imagen de diapositiva 1"/>
+          <p:cNvSpPr>
+            <a:spLocks noGrp="1" noRot="1" noChangeAspect="1"/>
+          </p:cNvSpPr>
+          <p:nvPr>
+            <p:ph type="sldImg"/>
+          </p:nvPr>
+        </p:nvSpPr>
+        <p:spPr>
+          <a:xfrm>
+            <a:off x="381000" y="685800"/>
+            <a:ext cx="6096000" cy="3429000"/>
+          </a:xfrm>
+        </p:spPr>
+      </p:sp>
+      <p:sp>
+        <p:nvSpPr>
+          <p:cNvPr id="3" name="Marcador de notas 2"/>
+          <p:cNvSpPr>
+            <a:spLocks noGrp="1"/>
+          </p:cNvSpPr>
+          <p:nvPr>
+            <p:ph type="body" idx="1"/>
+          </p:nvPr>
+        </p:nvSpPr>
+        <p:spPr/>
+        <p:txBody>
+          <a:bodyPr/>
+          <a:lstStyle/>
+          <a:p>
+            <a:r>
+              <a:rPr lang="es-ES" sz="1100" b="0" i="0" u="none" strike="noStrike" cap="none" dirty="0">
+                <a:solidFill>
+                  <a:srgbClr val="000000"/>
+                </a:solidFill>
+                <a:effectLst/>
+                <a:latin typeface="Arial"/>
+                <a:ea typeface="Arial"/>
+                <a:cs typeface="Arial"/>
+                <a:sym typeface="Arial"/>
+              </a:rPr>
+              <a:t>Es interesante analizar la relación que existe entre el valor de los parámetros del modelo y las regiones de intolerancia y tolerancia.</a:t>
+            </a:r>
+          </a:p>
+          <a:p>
+            <a:pPr marL="139700" indent="0">
+              <a:buNone/>
+            </a:pPr>
+            <a:endParaRPr lang="es-ES" sz="1100" b="0" i="0" u="none" strike="noStrike" cap="none" dirty="0">
+              <a:solidFill>
+                <a:srgbClr val="000000"/>
+              </a:solidFill>
+              <a:effectLst/>
+              <a:latin typeface="Arial"/>
+              <a:ea typeface="Arial"/>
+              <a:cs typeface="Arial"/>
+              <a:sym typeface="Arial"/>
+            </a:endParaRPr>
+          </a:p>
+          <a:p>
+            <a:r>
+              <a:rPr lang="es-ES" sz="1100" b="0" i="0" u="none" strike="noStrike" cap="none" dirty="0">
+                <a:solidFill>
+                  <a:srgbClr val="000000"/>
+                </a:solidFill>
+                <a:effectLst/>
+                <a:latin typeface="Arial"/>
+                <a:ea typeface="Arial"/>
+                <a:cs typeface="Arial"/>
+                <a:sym typeface="Arial"/>
+              </a:rPr>
+              <a:t>Si dejamos uno de los dos parámetros fijos, es posible cambiar de una región a otra con tan solo modificar el otro parámetro. De hecho, de acuerdo con este modelo, patógenos (y tumores) pueden escapar de la acción de las células T por dos métodos: reduciendo el efecto de las células T, el parámetro beta, o reduciendo su tasa de proliferación, el parámetro </a:t>
+            </a:r>
+            <a:r>
+              <a:rPr lang="es-ES" sz="1100" b="0" i="0" u="none" strike="noStrike" cap="none" dirty="0" err="1">
+                <a:solidFill>
+                  <a:srgbClr val="000000"/>
+                </a:solidFill>
+                <a:effectLst/>
+                <a:latin typeface="Arial"/>
+                <a:ea typeface="Arial"/>
+                <a:cs typeface="Arial"/>
+                <a:sym typeface="Arial"/>
+              </a:rPr>
+              <a:t>alpha</a:t>
+            </a:r>
+            <a:r>
+              <a:rPr lang="es-ES" sz="1100" b="0" i="0" u="none" strike="noStrike" cap="none" dirty="0">
+                <a:solidFill>
+                  <a:srgbClr val="000000"/>
+                </a:solidFill>
+                <a:effectLst/>
+                <a:latin typeface="Arial"/>
+                <a:ea typeface="Arial"/>
+                <a:cs typeface="Arial"/>
+                <a:sym typeface="Arial"/>
+              </a:rPr>
+              <a:t>, </a:t>
+            </a:r>
+          </a:p>
+          <a:p>
+            <a:r>
+              <a:rPr lang="es-ES" sz="1100" b="0" i="0" u="none" strike="noStrike" cap="none" dirty="0">
+                <a:solidFill>
+                  <a:srgbClr val="000000"/>
+                </a:solidFill>
+                <a:effectLst/>
+                <a:latin typeface="Arial"/>
+                <a:ea typeface="Arial"/>
+                <a:cs typeface="Arial"/>
+                <a:sym typeface="Arial"/>
+              </a:rPr>
+              <a:t>Una consecuencia que se puede extraer de esto es que mecanismos como la fiebre, que incrementa la tasa de proliferación del patógeno, o la inflamación, que aumenta la acción de las células T, favorecen que el patógeno sea vencido.</a:t>
+            </a:r>
+          </a:p>
+          <a:p>
+            <a:endParaRPr lang="es-ES" dirty="0"/>
+          </a:p>
+        </p:txBody>
+      </p:sp>
+    </p:spTree>
+    <p:extLst>
+      <p:ext uri="{BB962C8B-B14F-4D97-AF65-F5344CB8AC3E}">
+        <p14:creationId xmlns:p14="http://schemas.microsoft.com/office/powerpoint/2010/main" val="1420610306"/>
+      </p:ext>
+    </p:extLst>
+  </p:cSld>
+  <p:clrMapOvr>
+    <a:masterClrMapping/>
+  </p:clrMapOvr>
+</p:notes>
+</file>
+
+<file path=ppt/notesSlides/notesSlide21.xml><?xml version="1.0" encoding="utf-8"?>
+<p:notes xmlns:a="http://schemas.openxmlformats.org/drawingml/2006/main" xmlns:r="http://schemas.openxmlformats.org/officeDocument/2006/relationships" xmlns:p="http://schemas.openxmlformats.org/presentationml/2006/main" showMasterSp="0" showMasterPhAnim="0">
+  <p:cSld>
+    <p:spTree>
+      <p:nvGrpSpPr>
+        <p:cNvPr id="1" name="Shape 70"/>
+        <p:cNvGrpSpPr/>
+        <p:nvPr/>
+      </p:nvGrpSpPr>
+      <p:grpSpPr>
+        <a:xfrm>
+          <a:off x="0" y="0"/>
+          <a:ext cx="0" cy="0"/>
+          <a:chOff x="0" y="0"/>
+          <a:chExt cx="0" cy="0"/>
+        </a:xfrm>
+      </p:grpSpPr>
+      <p:sp>
+        <p:nvSpPr>
+          <p:cNvPr id="71" name="Google Shape;71;g35f391192_029:notes"/>
+          <p:cNvSpPr>
+            <a:spLocks noGrp="1" noRot="1" noChangeAspect="1"/>
+          </p:cNvSpPr>
+          <p:nvPr>
+            <p:ph type="sldImg" idx="2"/>
+          </p:nvPr>
+        </p:nvSpPr>
+        <p:spPr>
+          <a:xfrm>
+            <a:off x="381000" y="685800"/>
+            <a:ext cx="6096000" cy="3429000"/>
+          </a:xfrm>
+          <a:custGeom>
+            <a:avLst/>
+            <a:gdLst/>
+            <a:ahLst/>
+            <a:cxnLst/>
+            <a:rect l="l" t="t" r="r" b="b"/>
+            <a:pathLst>
+              <a:path w="120000" h="120000" extrusionOk="0">
+                <a:moveTo>
+                  <a:pt x="0" y="0"/>
+                </a:moveTo>
+                <a:lnTo>
+                  <a:pt x="120000" y="0"/>
+                </a:lnTo>
+                <a:lnTo>
+                  <a:pt x="120000" y="120000"/>
+                </a:lnTo>
+                <a:lnTo>
+                  <a:pt x="0" y="120000"/>
+                </a:lnTo>
+                <a:close/>
+              </a:path>
+            </a:pathLst>
+          </a:custGeom>
+        </p:spPr>
+      </p:sp>
+      <p:sp>
+        <p:nvSpPr>
+          <p:cNvPr id="72" name="Google Shape;72;g35f391192_029:notes"/>
+          <p:cNvSpPr txBox="1">
+            <a:spLocks noGrp="1"/>
+          </p:cNvSpPr>
+          <p:nvPr>
+            <p:ph type="body" idx="1"/>
+          </p:nvPr>
+        </p:nvSpPr>
+        <p:spPr>
+          <a:xfrm>
+            <a:off x="685800" y="4343400"/>
+            <a:ext cx="5486400" cy="4114800"/>
+          </a:xfrm>
+          <a:prstGeom prst="rect">
+            <a:avLst/>
+          </a:prstGeom>
+        </p:spPr>
+        <p:txBody>
+          <a:bodyPr spcFirstLastPara="1" wrap="square" lIns="91425" tIns="91425" rIns="91425" bIns="91425" anchor="t" anchorCtr="0">
+            <a:noAutofit/>
+          </a:bodyPr>
+          <a:lstStyle/>
+          <a:p>
+            <a:pPr marL="0" lvl="0" indent="0" algn="l" rtl="0">
+              <a:spcBef>
+                <a:spcPts val="0"/>
+              </a:spcBef>
+              <a:spcAft>
+                <a:spcPts val="0"/>
+              </a:spcAft>
+              <a:buNone/>
+            </a:pPr>
+            <a:endParaRPr/>
+          </a:p>
+        </p:txBody>
+      </p:sp>
+    </p:spTree>
+    <p:extLst>
+      <p:ext uri="{BB962C8B-B14F-4D97-AF65-F5344CB8AC3E}">
+        <p14:creationId xmlns:p14="http://schemas.microsoft.com/office/powerpoint/2010/main" val="2226417868"/>
+      </p:ext>
+    </p:extLst>
+  </p:cSld>
+  <p:clrMapOvr>
+    <a:masterClrMapping/>
+  </p:clrMapOvr>
+</p:notes>
+</file>
+
+<file path=ppt/notesSlides/notesSlide22.xml><?xml version="1.0" encoding="utf-8"?>
 <p:notes xmlns:a="http://schemas.openxmlformats.org/drawingml/2006/main" xmlns:r="http://schemas.openxmlformats.org/officeDocument/2006/relationships" xmlns:p="http://schemas.openxmlformats.org/presentationml/2006/main">
   <p:cSld>
     <p:spTree>
@@ -18899,7 +19225,7 @@
           <p:nvPr/>
         </p:nvPicPr>
         <p:blipFill>
-          <a:blip r:embed="rId2"/>
+          <a:blip r:embed="rId3"/>
           <a:stretch>
             <a:fillRect/>
           </a:stretch>
@@ -18929,7 +19255,7 @@
           <p:nvPr/>
         </p:nvPicPr>
         <p:blipFill>
-          <a:blip r:embed="rId3"/>
+          <a:blip r:embed="rId4"/>
           <a:stretch>
             <a:fillRect/>
           </a:stretch>
@@ -19319,7 +19645,7 @@
           <p:nvPr/>
         </p:nvPicPr>
         <p:blipFill>
-          <a:blip r:embed="rId4"/>
+          <a:blip r:embed="rId5"/>
           <a:stretch>
             <a:fillRect/>
           </a:stretch>
@@ -19644,7 +19970,7 @@
           <p:nvPr/>
         </p:nvPicPr>
         <p:blipFill rotWithShape="1">
-          <a:blip r:embed="rId2"/>
+          <a:blip r:embed="rId3"/>
           <a:srcRect l="15438" r="19355"/>
           <a:stretch/>
         </p:blipFill>
@@ -19658,6 +19984,240 @@
           </a:prstGeom>
         </p:spPr>
       </p:pic>
+      <mc:AlternateContent xmlns:mc="http://schemas.openxmlformats.org/markup-compatibility/2006">
+        <mc:Choice xmlns:a14="http://schemas.microsoft.com/office/drawing/2010/main" Requires="a14">
+          <p:sp>
+            <p:nvSpPr>
+              <p:cNvPr id="3" name="CuadroTexto 2">
+                <a:extLst>
+                  <a:ext uri="{FF2B5EF4-FFF2-40B4-BE49-F238E27FC236}">
+                    <a16:creationId xmlns:a16="http://schemas.microsoft.com/office/drawing/2014/main" id="{70C87E2E-D3A4-4123-B88A-561323ED5304}"/>
+                  </a:ext>
+                </a:extLst>
+              </p:cNvPr>
+              <p:cNvSpPr txBox="1"/>
+              <p:nvPr/>
+            </p:nvSpPr>
+            <p:spPr>
+              <a:xfrm>
+                <a:off x="787424" y="2197601"/>
+                <a:ext cx="2251611" cy="461665"/>
+              </a:xfrm>
+              <a:prstGeom prst="rect">
+                <a:avLst/>
+              </a:prstGeom>
+              <a:noFill/>
+            </p:spPr>
+            <p:txBody>
+              <a:bodyPr wrap="square" rtlCol="0">
+                <a:spAutoFit/>
+              </a:bodyPr>
+              <a:lstStyle/>
+              <a:p>
+                <a14:m>
+                  <m:oMath xmlns:m="http://schemas.openxmlformats.org/officeDocument/2006/math">
+                    <m:sSup>
+                      <m:sSupPr>
+                        <m:ctrlPr>
+                          <a:rPr lang="es-ES" sz="1200" i="1" smtClean="0">
+                            <a:latin typeface="Cambria Math" panose="02040503050406030204" pitchFamily="18" charset="0"/>
+                            <a:ea typeface="Cambria Math" panose="02040503050406030204" pitchFamily="18" charset="0"/>
+                          </a:rPr>
+                        </m:ctrlPr>
+                      </m:sSupPr>
+                      <m:e>
+                        <m:r>
+                          <a:rPr lang="es-ES" sz="1200" i="1" smtClean="0">
+                            <a:latin typeface="Cambria Math" panose="02040503050406030204" pitchFamily="18" charset="0"/>
+                            <a:ea typeface="Cambria Math" panose="02040503050406030204" pitchFamily="18" charset="0"/>
+                          </a:rPr>
+                          <m:t>𝛼</m:t>
+                        </m:r>
+                      </m:e>
+                      <m:sup>
+                        <m:r>
+                          <a:rPr lang="es-ES" sz="1200" b="0" i="1" smtClean="0">
+                            <a:latin typeface="Cambria Math" panose="02040503050406030204" pitchFamily="18" charset="0"/>
+                            <a:ea typeface="Cambria Math" panose="02040503050406030204" pitchFamily="18" charset="0"/>
+                          </a:rPr>
+                          <m:t>∗</m:t>
+                        </m:r>
+                      </m:sup>
+                    </m:sSup>
+                  </m:oMath>
+                </a14:m>
+                <a:r>
+                  <a:rPr lang="es-ES" sz="1200" dirty="0">
+                    <a:latin typeface="PT Serif" panose="020B0604020202020204" charset="0"/>
+                  </a:rPr>
+                  <a:t>: Tasa de reproducción del patógeno</a:t>
+                </a:r>
+              </a:p>
+            </p:txBody>
+          </p:sp>
+        </mc:Choice>
+        <mc:Fallback>
+          <p:sp>
+            <p:nvSpPr>
+              <p:cNvPr id="3" name="CuadroTexto 2">
+                <a:extLst>
+                  <a:ext uri="{FF2B5EF4-FFF2-40B4-BE49-F238E27FC236}">
+                    <a16:creationId xmlns:a16="http://schemas.microsoft.com/office/drawing/2014/main" id="{70C87E2E-D3A4-4123-B88A-561323ED5304}"/>
+                  </a:ext>
+                </a:extLst>
+              </p:cNvPr>
+              <p:cNvSpPr txBox="1">
+                <a:spLocks noRot="1" noChangeAspect="1" noMove="1" noResize="1" noEditPoints="1" noAdjustHandles="1" noChangeArrowheads="1" noChangeShapeType="1" noTextEdit="1"/>
+              </p:cNvSpPr>
+              <p:nvPr/>
+            </p:nvSpPr>
+            <p:spPr>
+              <a:xfrm>
+                <a:off x="787424" y="2197601"/>
+                <a:ext cx="2251611" cy="461665"/>
+              </a:xfrm>
+              <a:prstGeom prst="rect">
+                <a:avLst/>
+              </a:prstGeom>
+              <a:blipFill>
+                <a:blip r:embed="rId4"/>
+                <a:stretch>
+                  <a:fillRect b="-9211"/>
+                </a:stretch>
+              </a:blipFill>
+            </p:spPr>
+            <p:txBody>
+              <a:bodyPr/>
+              <a:lstStyle/>
+              <a:p>
+                <a:r>
+                  <a:rPr lang="es-ES">
+                    <a:noFill/>
+                  </a:rPr>
+                  <a:t> </a:t>
+                </a:r>
+              </a:p>
+            </p:txBody>
+          </p:sp>
+        </mc:Fallback>
+      </mc:AlternateContent>
+      <mc:AlternateContent xmlns:mc="http://schemas.openxmlformats.org/markup-compatibility/2006">
+        <mc:Choice xmlns:a14="http://schemas.microsoft.com/office/drawing/2010/main" Requires="a14">
+          <p:sp>
+            <p:nvSpPr>
+              <p:cNvPr id="7" name="CuadroTexto 6">
+                <a:extLst>
+                  <a:ext uri="{FF2B5EF4-FFF2-40B4-BE49-F238E27FC236}">
+                    <a16:creationId xmlns:a16="http://schemas.microsoft.com/office/drawing/2014/main" id="{5CCE5BDF-D80D-45CC-B8D7-1B92587A9E35}"/>
+                  </a:ext>
+                </a:extLst>
+              </p:cNvPr>
+              <p:cNvSpPr txBox="1"/>
+              <p:nvPr/>
+            </p:nvSpPr>
+            <p:spPr>
+              <a:xfrm>
+                <a:off x="6089787" y="3448869"/>
+                <a:ext cx="2780528" cy="430887"/>
+              </a:xfrm>
+              <a:prstGeom prst="rect">
+                <a:avLst/>
+              </a:prstGeom>
+              <a:noFill/>
+            </p:spPr>
+            <p:txBody>
+              <a:bodyPr wrap="square" rtlCol="0">
+                <a:spAutoFit/>
+              </a:bodyPr>
+              <a:lstStyle/>
+              <a:p>
+                <a14:m>
+                  <m:oMath xmlns:m="http://schemas.openxmlformats.org/officeDocument/2006/math">
+                    <m:sSup>
+                      <m:sSupPr>
+                        <m:ctrlPr>
+                          <a:rPr lang="es-ES" sz="1100" i="1" smtClean="0">
+                            <a:latin typeface="Cambria Math" panose="02040503050406030204" pitchFamily="18" charset="0"/>
+                            <a:ea typeface="Cambria Math" panose="02040503050406030204" pitchFamily="18" charset="0"/>
+                          </a:rPr>
+                        </m:ctrlPr>
+                      </m:sSupPr>
+                      <m:e>
+                        <m:r>
+                          <a:rPr lang="es-ES" sz="1100" i="1" smtClean="0">
+                            <a:latin typeface="Cambria Math" panose="02040503050406030204" pitchFamily="18" charset="0"/>
+                            <a:ea typeface="Cambria Math" panose="02040503050406030204" pitchFamily="18" charset="0"/>
+                          </a:rPr>
+                          <m:t>𝛽</m:t>
+                        </m:r>
+                      </m:e>
+                      <m:sup>
+                        <m:r>
+                          <a:rPr lang="es-ES" sz="1100" b="0" i="1" smtClean="0">
+                            <a:latin typeface="Cambria Math" panose="02040503050406030204" pitchFamily="18" charset="0"/>
+                            <a:ea typeface="Cambria Math" panose="02040503050406030204" pitchFamily="18" charset="0"/>
+                          </a:rPr>
+                          <m:t>∗</m:t>
+                        </m:r>
+                      </m:sup>
+                    </m:sSup>
+                  </m:oMath>
+                </a14:m>
+                <a:r>
+                  <a:rPr lang="es-ES" sz="1100" dirty="0">
+                    <a:latin typeface="PT Serif" panose="020B0604020202020204" charset="0"/>
+                  </a:rPr>
+                  <a:t>: Tasa de eliminación del patógeno a causa de las células T</a:t>
+                </a:r>
+              </a:p>
+            </p:txBody>
+          </p:sp>
+        </mc:Choice>
+        <mc:Fallback>
+          <p:sp>
+            <p:nvSpPr>
+              <p:cNvPr id="7" name="CuadroTexto 6">
+                <a:extLst>
+                  <a:ext uri="{FF2B5EF4-FFF2-40B4-BE49-F238E27FC236}">
+                    <a16:creationId xmlns:a16="http://schemas.microsoft.com/office/drawing/2014/main" id="{5CCE5BDF-D80D-45CC-B8D7-1B92587A9E35}"/>
+                  </a:ext>
+                </a:extLst>
+              </p:cNvPr>
+              <p:cNvSpPr txBox="1">
+                <a:spLocks noRot="1" noChangeAspect="1" noMove="1" noResize="1" noEditPoints="1" noAdjustHandles="1" noChangeArrowheads="1" noChangeShapeType="1" noTextEdit="1"/>
+              </p:cNvSpPr>
+              <p:nvPr/>
+            </p:nvSpPr>
+            <p:spPr>
+              <a:xfrm>
+                <a:off x="6089787" y="3448869"/>
+                <a:ext cx="2780528" cy="430887"/>
+              </a:xfrm>
+              <a:prstGeom prst="rect">
+                <a:avLst/>
+              </a:prstGeom>
+              <a:blipFill>
+                <a:blip r:embed="rId5"/>
+                <a:stretch>
+                  <a:fillRect b="-10000"/>
+                </a:stretch>
+              </a:blipFill>
+            </p:spPr>
+            <p:txBody>
+              <a:bodyPr/>
+              <a:lstStyle/>
+              <a:p>
+                <a:r>
+                  <a:rPr lang="es-ES">
+                    <a:noFill/>
+                  </a:rPr>
+                  <a:t> </a:t>
+                </a:r>
+              </a:p>
+            </p:txBody>
+          </p:sp>
+        </mc:Fallback>
+      </mc:AlternateContent>
     </p:spTree>
     <p:extLst>
       <p:ext uri="{BB962C8B-B14F-4D97-AF65-F5344CB8AC3E}">
@@ -19668,135 +20228,6 @@
   <p:clrMapOvr>
     <a:masterClrMapping/>
   </p:clrMapOvr>
-  <p:timing>
-    <p:tnLst>
-      <p:par>
-        <p:cTn id="1" dur="indefinite" restart="never" nodeType="tmRoot">
-          <p:childTnLst>
-            <p:seq concurrent="1" nextAc="seek">
-              <p:cTn id="2" dur="indefinite" nodeType="mainSeq">
-                <p:childTnLst>
-                  <p:par>
-                    <p:cTn id="3" fill="hold">
-                      <p:stCondLst>
-                        <p:cond delay="indefinite"/>
-                      </p:stCondLst>
-                      <p:childTnLst>
-                        <p:par>
-                          <p:cTn id="4" fill="hold">
-                            <p:stCondLst>
-                              <p:cond delay="0"/>
-                            </p:stCondLst>
-                            <p:childTnLst>
-                              <p:par>
-                                <p:cTn id="5" presetID="10" presetClass="entr" presetSubtype="0" fill="hold" nodeType="clickEffect">
-                                  <p:stCondLst>
-                                    <p:cond delay="0"/>
-                                  </p:stCondLst>
-                                  <p:childTnLst>
-                                    <p:set>
-                                      <p:cBhvr>
-                                        <p:cTn id="6" dur="1" fill="hold">
-                                          <p:stCondLst>
-                                            <p:cond delay="0"/>
-                                          </p:stCondLst>
-                                        </p:cTn>
-                                        <p:tgtEl>
-                                          <p:spTgt spid="13"/>
-                                        </p:tgtEl>
-                                        <p:attrNameLst>
-                                          <p:attrName>style.visibility</p:attrName>
-                                        </p:attrNameLst>
-                                      </p:cBhvr>
-                                      <p:to>
-                                        <p:strVal val="visible"/>
-                                      </p:to>
-                                    </p:set>
-                                    <p:animEffect transition="in" filter="fade">
-                                      <p:cBhvr>
-                                        <p:cTn id="7" dur="500"/>
-                                        <p:tgtEl>
-                                          <p:spTgt spid="13"/>
-                                        </p:tgtEl>
-                                      </p:cBhvr>
-                                    </p:animEffect>
-                                  </p:childTnLst>
-                                </p:cTn>
-                              </p:par>
-                              <p:par>
-                                <p:cTn id="8" presetID="10" presetClass="entr" presetSubtype="0" fill="hold" grpId="0" nodeType="withEffect">
-                                  <p:stCondLst>
-                                    <p:cond delay="0"/>
-                                  </p:stCondLst>
-                                  <p:childTnLst>
-                                    <p:set>
-                                      <p:cBhvr>
-                                        <p:cTn id="9" dur="1" fill="hold">
-                                          <p:stCondLst>
-                                            <p:cond delay="0"/>
-                                          </p:stCondLst>
-                                        </p:cTn>
-                                        <p:tgtEl>
-                                          <p:spTgt spid="5">
-                                            <p:txEl>
-                                              <p:pRg st="0" end="0"/>
-                                            </p:txEl>
-                                          </p:spTgt>
-                                        </p:tgtEl>
-                                        <p:attrNameLst>
-                                          <p:attrName>style.visibility</p:attrName>
-                                        </p:attrNameLst>
-                                      </p:cBhvr>
-                                      <p:to>
-                                        <p:strVal val="visible"/>
-                                      </p:to>
-                                    </p:set>
-                                    <p:animEffect transition="in" filter="fade">
-                                      <p:cBhvr>
-                                        <p:cTn id="10" dur="500"/>
-                                        <p:tgtEl>
-                                          <p:spTgt spid="5">
-                                            <p:txEl>
-                                              <p:pRg st="0" end="0"/>
-                                            </p:txEl>
-                                          </p:spTgt>
-                                        </p:tgtEl>
-                                      </p:cBhvr>
-                                    </p:animEffect>
-                                  </p:childTnLst>
-                                </p:cTn>
-                              </p:par>
-                            </p:childTnLst>
-                          </p:cTn>
-                        </p:par>
-                      </p:childTnLst>
-                    </p:cTn>
-                  </p:par>
-                </p:childTnLst>
-              </p:cTn>
-              <p:prevCondLst>
-                <p:cond evt="onPrev" delay="0">
-                  <p:tgtEl>
-                    <p:sldTgt/>
-                  </p:tgtEl>
-                </p:cond>
-              </p:prevCondLst>
-              <p:nextCondLst>
-                <p:cond evt="onNext" delay="0">
-                  <p:tgtEl>
-                    <p:sldTgt/>
-                  </p:tgtEl>
-                </p:cond>
-              </p:nextCondLst>
-            </p:seq>
-          </p:childTnLst>
-        </p:cTn>
-      </p:par>
-    </p:tnLst>
-    <p:bldLst>
-      <p:bldP spid="5" grpId="0" build="p"/>
-    </p:bldLst>
-  </p:timing>
 </p:sld>
 </file>
 

</xml_diff>